<commit_message>
add new bindings for ILS
</commit_message>
<xml_diff>
--- a/mapping-f14-pilot.pptx
+++ b/mapping-f14-pilot.pptx
@@ -4,6 +4,9 @@
   <p:sldMasterIdLst>
     <p:sldMasterId id="2147483648" r:id="rId1"/>
   </p:sldMasterIdLst>
+  <p:notesMasterIdLst>
+    <p:notesMasterId r:id="rId3"/>
+  </p:notesMasterIdLst>
   <p:sldIdLst>
     <p:sldId id="259" r:id="rId2"/>
   </p:sldIdLst>
@@ -123,6 +126,356 @@
 </p:presentation>
 </file>
 
+<file path=ppt/notesMasters/notesMaster1.xml><?xml version="1.0" encoding="utf-8"?>
+<p:notesMaster xmlns:a="http://schemas.openxmlformats.org/drawingml/2006/main" xmlns:r="http://schemas.openxmlformats.org/officeDocument/2006/relationships" xmlns:p="http://schemas.openxmlformats.org/presentationml/2006/main">
+  <p:cSld>
+    <p:bg>
+      <p:bgRef idx="1001">
+        <a:schemeClr val="bg1"/>
+      </p:bgRef>
+    </p:bg>
+    <p:spTree>
+      <p:nvGrpSpPr>
+        <p:cNvPr id="1" name=""/>
+        <p:cNvGrpSpPr/>
+        <p:nvPr/>
+      </p:nvGrpSpPr>
+      <p:grpSpPr>
+        <a:xfrm>
+          <a:off x="0" y="0"/>
+          <a:ext cx="0" cy="0"/>
+          <a:chOff x="0" y="0"/>
+          <a:chExt cx="0" cy="0"/>
+        </a:xfrm>
+      </p:grpSpPr>
+      <p:sp>
+        <p:nvSpPr>
+          <p:cNvPr id="2" name="Espace réservé de l'en-tête 1"/>
+          <p:cNvSpPr>
+            <a:spLocks noGrp="1"/>
+          </p:cNvSpPr>
+          <p:nvPr>
+            <p:ph type="hdr" sz="quarter"/>
+          </p:nvPr>
+        </p:nvSpPr>
+        <p:spPr>
+          <a:xfrm>
+            <a:off x="0" y="0"/>
+            <a:ext cx="2971800" cy="458788"/>
+          </a:xfrm>
+          <a:prstGeom prst="rect">
+            <a:avLst/>
+          </a:prstGeom>
+        </p:spPr>
+        <p:txBody>
+          <a:bodyPr vert="horz" lIns="91440" tIns="45720" rIns="91440" bIns="45720" rtlCol="0"/>
+          <a:lstStyle>
+            <a:lvl1pPr algn="l">
+              <a:defRPr sz="1200"/>
+            </a:lvl1pPr>
+          </a:lstStyle>
+          <a:p>
+            <a:endParaRPr lang="fr-FR"/>
+          </a:p>
+        </p:txBody>
+      </p:sp>
+      <p:sp>
+        <p:nvSpPr>
+          <p:cNvPr id="3" name="Espace réservé de la date 2"/>
+          <p:cNvSpPr>
+            <a:spLocks noGrp="1"/>
+          </p:cNvSpPr>
+          <p:nvPr>
+            <p:ph type="dt" idx="1"/>
+          </p:nvPr>
+        </p:nvSpPr>
+        <p:spPr>
+          <a:xfrm>
+            <a:off x="3884613" y="0"/>
+            <a:ext cx="2971800" cy="458788"/>
+          </a:xfrm>
+          <a:prstGeom prst="rect">
+            <a:avLst/>
+          </a:prstGeom>
+        </p:spPr>
+        <p:txBody>
+          <a:bodyPr vert="horz" lIns="91440" tIns="45720" rIns="91440" bIns="45720" rtlCol="0"/>
+          <a:lstStyle>
+            <a:lvl1pPr algn="r">
+              <a:defRPr sz="1200"/>
+            </a:lvl1pPr>
+          </a:lstStyle>
+          <a:p>
+            <a:fld id="{24F5B8CC-66DC-4445-ABC3-9BFE738720DB}" type="datetimeFigureOut">
+              <a:rPr lang="fr-FR" smtClean="0"/>
+              <a:t>23/03/2020</a:t>
+            </a:fld>
+            <a:endParaRPr lang="fr-FR"/>
+          </a:p>
+        </p:txBody>
+      </p:sp>
+      <p:sp>
+        <p:nvSpPr>
+          <p:cNvPr id="4" name="Espace réservé de l'image des diapositives 3"/>
+          <p:cNvSpPr>
+            <a:spLocks noGrp="1" noRot="1" noChangeAspect="1"/>
+          </p:cNvSpPr>
+          <p:nvPr>
+            <p:ph type="sldImg" idx="2"/>
+          </p:nvPr>
+        </p:nvSpPr>
+        <p:spPr>
+          <a:xfrm>
+            <a:off x="685800" y="1143000"/>
+            <a:ext cx="5486400" cy="3086100"/>
+          </a:xfrm>
+          <a:prstGeom prst="rect">
+            <a:avLst/>
+          </a:prstGeom>
+          <a:noFill/>
+          <a:ln w="12700">
+            <a:solidFill>
+              <a:prstClr val="black"/>
+            </a:solidFill>
+          </a:ln>
+        </p:spPr>
+        <p:txBody>
+          <a:bodyPr vert="horz" lIns="91440" tIns="45720" rIns="91440" bIns="45720" rtlCol="0" anchor="ctr"/>
+          <a:lstStyle/>
+          <a:p>
+            <a:endParaRPr lang="fr-FR"/>
+          </a:p>
+        </p:txBody>
+      </p:sp>
+      <p:sp>
+        <p:nvSpPr>
+          <p:cNvPr id="5" name="Espace réservé des notes 4"/>
+          <p:cNvSpPr>
+            <a:spLocks noGrp="1"/>
+          </p:cNvSpPr>
+          <p:nvPr>
+            <p:ph type="body" sz="quarter" idx="3"/>
+          </p:nvPr>
+        </p:nvSpPr>
+        <p:spPr>
+          <a:xfrm>
+            <a:off x="685800" y="4400550"/>
+            <a:ext cx="5486400" cy="3600450"/>
+          </a:xfrm>
+          <a:prstGeom prst="rect">
+            <a:avLst/>
+          </a:prstGeom>
+        </p:spPr>
+        <p:txBody>
+          <a:bodyPr vert="horz" lIns="91440" tIns="45720" rIns="91440" bIns="45720" rtlCol="0"/>
+          <a:lstStyle/>
+          <a:p>
+            <a:pPr lvl="0"/>
+            <a:r>
+              <a:rPr lang="fr-FR" smtClean="0"/>
+              <a:t>Modifier les styles du texte du masque</a:t>
+            </a:r>
+          </a:p>
+          <a:p>
+            <a:pPr lvl="1"/>
+            <a:r>
+              <a:rPr lang="fr-FR" smtClean="0"/>
+              <a:t>Deuxième niveau</a:t>
+            </a:r>
+          </a:p>
+          <a:p>
+            <a:pPr lvl="2"/>
+            <a:r>
+              <a:rPr lang="fr-FR" smtClean="0"/>
+              <a:t>Troisième niveau</a:t>
+            </a:r>
+          </a:p>
+          <a:p>
+            <a:pPr lvl="3"/>
+            <a:r>
+              <a:rPr lang="fr-FR" smtClean="0"/>
+              <a:t>Quatrième niveau</a:t>
+            </a:r>
+          </a:p>
+          <a:p>
+            <a:pPr lvl="4"/>
+            <a:r>
+              <a:rPr lang="fr-FR" smtClean="0"/>
+              <a:t>Cinquième niveau</a:t>
+            </a:r>
+            <a:endParaRPr lang="fr-FR"/>
+          </a:p>
+        </p:txBody>
+      </p:sp>
+      <p:sp>
+        <p:nvSpPr>
+          <p:cNvPr id="6" name="Espace réservé du pied de page 5"/>
+          <p:cNvSpPr>
+            <a:spLocks noGrp="1"/>
+          </p:cNvSpPr>
+          <p:nvPr>
+            <p:ph type="ftr" sz="quarter" idx="4"/>
+          </p:nvPr>
+        </p:nvSpPr>
+        <p:spPr>
+          <a:xfrm>
+            <a:off x="0" y="8685213"/>
+            <a:ext cx="2971800" cy="458787"/>
+          </a:xfrm>
+          <a:prstGeom prst="rect">
+            <a:avLst/>
+          </a:prstGeom>
+        </p:spPr>
+        <p:txBody>
+          <a:bodyPr vert="horz" lIns="91440" tIns="45720" rIns="91440" bIns="45720" rtlCol="0" anchor="b"/>
+          <a:lstStyle>
+            <a:lvl1pPr algn="l">
+              <a:defRPr sz="1200"/>
+            </a:lvl1pPr>
+          </a:lstStyle>
+          <a:p>
+            <a:endParaRPr lang="fr-FR"/>
+          </a:p>
+        </p:txBody>
+      </p:sp>
+      <p:sp>
+        <p:nvSpPr>
+          <p:cNvPr id="7" name="Espace réservé du numéro de diapositive 6"/>
+          <p:cNvSpPr>
+            <a:spLocks noGrp="1"/>
+          </p:cNvSpPr>
+          <p:nvPr>
+            <p:ph type="sldNum" sz="quarter" idx="5"/>
+          </p:nvPr>
+        </p:nvSpPr>
+        <p:spPr>
+          <a:xfrm>
+            <a:off x="3884613" y="8685213"/>
+            <a:ext cx="2971800" cy="458787"/>
+          </a:xfrm>
+          <a:prstGeom prst="rect">
+            <a:avLst/>
+          </a:prstGeom>
+        </p:spPr>
+        <p:txBody>
+          <a:bodyPr vert="horz" lIns="91440" tIns="45720" rIns="91440" bIns="45720" rtlCol="0" anchor="b"/>
+          <a:lstStyle>
+            <a:lvl1pPr algn="r">
+              <a:defRPr sz="1200"/>
+            </a:lvl1pPr>
+          </a:lstStyle>
+          <a:p>
+            <a:fld id="{48E6ADEF-D956-4C63-8DD7-3897834E0441}" type="slidenum">
+              <a:rPr lang="fr-FR" smtClean="0"/>
+              <a:t>‹N°›</a:t>
+            </a:fld>
+            <a:endParaRPr lang="fr-FR"/>
+          </a:p>
+        </p:txBody>
+      </p:sp>
+    </p:spTree>
+    <p:extLst>
+      <p:ext uri="{BB962C8B-B14F-4D97-AF65-F5344CB8AC3E}">
+        <p14:creationId xmlns:p14="http://schemas.microsoft.com/office/powerpoint/2010/main" val="496896261"/>
+      </p:ext>
+    </p:extLst>
+  </p:cSld>
+  <p:clrMap bg1="lt1" tx1="dk1" bg2="lt2" tx2="dk2" accent1="accent1" accent2="accent2" accent3="accent3" accent4="accent4" accent5="accent5" accent6="accent6" hlink="hlink" folHlink="folHlink"/>
+  <p:notesStyle>
+    <a:lvl1pPr marL="0" algn="l" defTabSz="914400" rtl="0" eaLnBrk="1" latinLnBrk="0" hangingPunct="1">
+      <a:defRPr sz="1200" kern="1200">
+        <a:solidFill>
+          <a:schemeClr val="tx1"/>
+        </a:solidFill>
+        <a:latin typeface="+mn-lt"/>
+        <a:ea typeface="+mn-ea"/>
+        <a:cs typeface="+mn-cs"/>
+      </a:defRPr>
+    </a:lvl1pPr>
+    <a:lvl2pPr marL="457200" algn="l" defTabSz="914400" rtl="0" eaLnBrk="1" latinLnBrk="0" hangingPunct="1">
+      <a:defRPr sz="1200" kern="1200">
+        <a:solidFill>
+          <a:schemeClr val="tx1"/>
+        </a:solidFill>
+        <a:latin typeface="+mn-lt"/>
+        <a:ea typeface="+mn-ea"/>
+        <a:cs typeface="+mn-cs"/>
+      </a:defRPr>
+    </a:lvl2pPr>
+    <a:lvl3pPr marL="914400" algn="l" defTabSz="914400" rtl="0" eaLnBrk="1" latinLnBrk="0" hangingPunct="1">
+      <a:defRPr sz="1200" kern="1200">
+        <a:solidFill>
+          <a:schemeClr val="tx1"/>
+        </a:solidFill>
+        <a:latin typeface="+mn-lt"/>
+        <a:ea typeface="+mn-ea"/>
+        <a:cs typeface="+mn-cs"/>
+      </a:defRPr>
+    </a:lvl3pPr>
+    <a:lvl4pPr marL="1371600" algn="l" defTabSz="914400" rtl="0" eaLnBrk="1" latinLnBrk="0" hangingPunct="1">
+      <a:defRPr sz="1200" kern="1200">
+        <a:solidFill>
+          <a:schemeClr val="tx1"/>
+        </a:solidFill>
+        <a:latin typeface="+mn-lt"/>
+        <a:ea typeface="+mn-ea"/>
+        <a:cs typeface="+mn-cs"/>
+      </a:defRPr>
+    </a:lvl4pPr>
+    <a:lvl5pPr marL="1828800" algn="l" defTabSz="914400" rtl="0" eaLnBrk="1" latinLnBrk="0" hangingPunct="1">
+      <a:defRPr sz="1200" kern="1200">
+        <a:solidFill>
+          <a:schemeClr val="tx1"/>
+        </a:solidFill>
+        <a:latin typeface="+mn-lt"/>
+        <a:ea typeface="+mn-ea"/>
+        <a:cs typeface="+mn-cs"/>
+      </a:defRPr>
+    </a:lvl5pPr>
+    <a:lvl6pPr marL="2286000" algn="l" defTabSz="914400" rtl="0" eaLnBrk="1" latinLnBrk="0" hangingPunct="1">
+      <a:defRPr sz="1200" kern="1200">
+        <a:solidFill>
+          <a:schemeClr val="tx1"/>
+        </a:solidFill>
+        <a:latin typeface="+mn-lt"/>
+        <a:ea typeface="+mn-ea"/>
+        <a:cs typeface="+mn-cs"/>
+      </a:defRPr>
+    </a:lvl6pPr>
+    <a:lvl7pPr marL="2743200" algn="l" defTabSz="914400" rtl="0" eaLnBrk="1" latinLnBrk="0" hangingPunct="1">
+      <a:defRPr sz="1200" kern="1200">
+        <a:solidFill>
+          <a:schemeClr val="tx1"/>
+        </a:solidFill>
+        <a:latin typeface="+mn-lt"/>
+        <a:ea typeface="+mn-ea"/>
+        <a:cs typeface="+mn-cs"/>
+      </a:defRPr>
+    </a:lvl7pPr>
+    <a:lvl8pPr marL="3200400" algn="l" defTabSz="914400" rtl="0" eaLnBrk="1" latinLnBrk="0" hangingPunct="1">
+      <a:defRPr sz="1200" kern="1200">
+        <a:solidFill>
+          <a:schemeClr val="tx1"/>
+        </a:solidFill>
+        <a:latin typeface="+mn-lt"/>
+        <a:ea typeface="+mn-ea"/>
+        <a:cs typeface="+mn-cs"/>
+      </a:defRPr>
+    </a:lvl8pPr>
+    <a:lvl9pPr marL="3657600" algn="l" defTabSz="914400" rtl="0" eaLnBrk="1" latinLnBrk="0" hangingPunct="1">
+      <a:defRPr sz="1200" kern="1200">
+        <a:solidFill>
+          <a:schemeClr val="tx1"/>
+        </a:solidFill>
+        <a:latin typeface="+mn-lt"/>
+        <a:ea typeface="+mn-ea"/>
+        <a:cs typeface="+mn-cs"/>
+      </a:defRPr>
+    </a:lvl9pPr>
+  </p:notesStyle>
+</p:notesMaster>
+</file>
+
 <file path=ppt/slideLayouts/slideLayout1.xml><?xml version="1.0" encoding="utf-8"?>
 <p:sldLayout xmlns:a="http://schemas.openxmlformats.org/drawingml/2006/main" xmlns:r="http://schemas.openxmlformats.org/officeDocument/2006/relationships" xmlns:p="http://schemas.openxmlformats.org/presentationml/2006/main" type="title" preserve="1">
   <p:cSld name="Diapositive de titre">
@@ -254,7 +607,7 @@
           <a:p>
             <a:fld id="{730E937F-CA40-4427-8BD6-CB5A6C86C2DF}" type="datetimeFigureOut">
               <a:rPr lang="fr-FR" smtClean="0"/>
-              <a:t>15/09/2019</a:t>
+              <a:t>23/03/2020</a:t>
             </a:fld>
             <a:endParaRPr lang="fr-FR"/>
           </a:p>
@@ -454,7 +807,7 @@
           <a:p>
             <a:fld id="{730E937F-CA40-4427-8BD6-CB5A6C86C2DF}" type="datetimeFigureOut">
               <a:rPr lang="fr-FR" smtClean="0"/>
-              <a:t>15/09/2019</a:t>
+              <a:t>23/03/2020</a:t>
             </a:fld>
             <a:endParaRPr lang="fr-FR"/>
           </a:p>
@@ -634,7 +987,7 @@
           <a:p>
             <a:fld id="{730E937F-CA40-4427-8BD6-CB5A6C86C2DF}" type="datetimeFigureOut">
               <a:rPr lang="fr-FR" smtClean="0"/>
-              <a:t>15/09/2019</a:t>
+              <a:t>23/03/2020</a:t>
             </a:fld>
             <a:endParaRPr lang="fr-FR"/>
           </a:p>
@@ -804,7 +1157,7 @@
           <a:p>
             <a:fld id="{730E937F-CA40-4427-8BD6-CB5A6C86C2DF}" type="datetimeFigureOut">
               <a:rPr lang="fr-FR" smtClean="0"/>
-              <a:t>15/09/2019</a:t>
+              <a:t>23/03/2020</a:t>
             </a:fld>
             <a:endParaRPr lang="fr-FR"/>
           </a:p>
@@ -1080,7 +1433,7 @@
           <a:p>
             <a:fld id="{730E937F-CA40-4427-8BD6-CB5A6C86C2DF}" type="datetimeFigureOut">
               <a:rPr lang="fr-FR" smtClean="0"/>
-              <a:t>15/09/2019</a:t>
+              <a:t>23/03/2020</a:t>
             </a:fld>
             <a:endParaRPr lang="fr-FR"/>
           </a:p>
@@ -1312,7 +1665,7 @@
           <a:p>
             <a:fld id="{730E937F-CA40-4427-8BD6-CB5A6C86C2DF}" type="datetimeFigureOut">
               <a:rPr lang="fr-FR" smtClean="0"/>
-              <a:t>15/09/2019</a:t>
+              <a:t>23/03/2020</a:t>
             </a:fld>
             <a:endParaRPr lang="fr-FR"/>
           </a:p>
@@ -1679,7 +2032,7 @@
           <a:p>
             <a:fld id="{730E937F-CA40-4427-8BD6-CB5A6C86C2DF}" type="datetimeFigureOut">
               <a:rPr lang="fr-FR" smtClean="0"/>
-              <a:t>15/09/2019</a:t>
+              <a:t>23/03/2020</a:t>
             </a:fld>
             <a:endParaRPr lang="fr-FR"/>
           </a:p>
@@ -1797,7 +2150,7 @@
           <a:p>
             <a:fld id="{730E937F-CA40-4427-8BD6-CB5A6C86C2DF}" type="datetimeFigureOut">
               <a:rPr lang="fr-FR" smtClean="0"/>
-              <a:t>15/09/2019</a:t>
+              <a:t>23/03/2020</a:t>
             </a:fld>
             <a:endParaRPr lang="fr-FR"/>
           </a:p>
@@ -1892,7 +2245,7 @@
           <a:p>
             <a:fld id="{730E937F-CA40-4427-8BD6-CB5A6C86C2DF}" type="datetimeFigureOut">
               <a:rPr lang="fr-FR" smtClean="0"/>
-              <a:t>15/09/2019</a:t>
+              <a:t>23/03/2020</a:t>
             </a:fld>
             <a:endParaRPr lang="fr-FR"/>
           </a:p>
@@ -2169,7 +2522,7 @@
           <a:p>
             <a:fld id="{730E937F-CA40-4427-8BD6-CB5A6C86C2DF}" type="datetimeFigureOut">
               <a:rPr lang="fr-FR" smtClean="0"/>
-              <a:t>15/09/2019</a:t>
+              <a:t>23/03/2020</a:t>
             </a:fld>
             <a:endParaRPr lang="fr-FR"/>
           </a:p>
@@ -2422,7 +2775,7 @@
           <a:p>
             <a:fld id="{730E937F-CA40-4427-8BD6-CB5A6C86C2DF}" type="datetimeFigureOut">
               <a:rPr lang="fr-FR" smtClean="0"/>
-              <a:t>15/09/2019</a:t>
+              <a:t>23/03/2020</a:t>
             </a:fld>
             <a:endParaRPr lang="fr-FR"/>
           </a:p>
@@ -2635,7 +2988,7 @@
           <a:p>
             <a:fld id="{730E937F-CA40-4427-8BD6-CB5A6C86C2DF}" type="datetimeFigureOut">
               <a:rPr lang="fr-FR" smtClean="0"/>
-              <a:t>15/09/2019</a:t>
+              <a:t>23/03/2020</a:t>
             </a:fld>
             <a:endParaRPr lang="fr-FR"/>
           </a:p>
@@ -3853,7 +4206,7 @@
                   </a:outerShdw>
                 </a:effectLst>
               </a:rPr>
-              <a:t>0.5.2</a:t>
+              <a:t>0.5.3</a:t>
             </a:r>
             <a:endParaRPr lang="fr-FR" sz="1000" b="1" dirty="0" smtClean="0">
               <a:ln w="0"/>
@@ -4897,10 +5250,29 @@
             <a:r>
               <a:rPr lang="fr-FR" sz="500" b="1" dirty="0" smtClean="0">
                 <a:solidFill>
+                  <a:schemeClr val="tx1"/>
+                </a:solidFill>
+              </a:rPr>
+              <a:t>ILS CHANEL INCREASE</a:t>
+            </a:r>
+          </a:p>
+          <a:p>
+            <a:pPr algn="ctr"/>
+            <a:r>
+              <a:rPr lang="fr-FR" sz="500" b="1" dirty="0" smtClean="0">
+                <a:solidFill>
                   <a:srgbClr val="FF0000"/>
                 </a:solidFill>
               </a:rPr>
-              <a:t>PLM BUTTON</a:t>
+              <a:t>PLM </a:t>
+            </a:r>
+            <a:r>
+              <a:rPr lang="fr-FR" sz="500" b="1" dirty="0" smtClean="0">
+                <a:solidFill>
+                  <a:srgbClr val="FF0000"/>
+                </a:solidFill>
+              </a:rPr>
+              <a:t>BUTTON</a:t>
             </a:r>
             <a:endParaRPr lang="fr-FR" sz="500" b="1" dirty="0">
               <a:solidFill>
@@ -4955,12 +5327,44 @@
           <a:p>
             <a:pPr algn="ctr"/>
             <a:r>
+              <a:rPr lang="fr-FR" sz="500" b="1" dirty="0">
+                <a:solidFill>
+                  <a:schemeClr val="tx1"/>
+                </a:solidFill>
+              </a:rPr>
+              <a:t>ILS CHANEL </a:t>
+            </a:r>
+            <a:r>
+              <a:rPr lang="fr-FR" sz="500" b="1" dirty="0" smtClean="0">
+                <a:solidFill>
+                  <a:schemeClr val="tx1"/>
+                </a:solidFill>
+              </a:rPr>
+              <a:t>DECREASE</a:t>
+            </a:r>
+            <a:endParaRPr lang="fr-FR" sz="500" b="1" dirty="0">
+              <a:solidFill>
+                <a:schemeClr val="tx1"/>
+              </a:solidFill>
+            </a:endParaRPr>
+          </a:p>
+          <a:p>
+            <a:pPr algn="ctr"/>
+            <a:r>
               <a:rPr lang="fr-FR" sz="500" b="1" dirty="0" smtClean="0">
                 <a:solidFill>
                   <a:srgbClr val="FF0000"/>
                 </a:solidFill>
               </a:rPr>
-              <a:t>TARGET DESIGNAT PAL</a:t>
+              <a:t>TARGET </a:t>
+            </a:r>
+            <a:r>
+              <a:rPr lang="fr-FR" sz="500" b="1" dirty="0" smtClean="0">
+                <a:solidFill>
+                  <a:srgbClr val="FF0000"/>
+                </a:solidFill>
+              </a:rPr>
+              <a:t>DESIGNAT PAL</a:t>
             </a:r>
             <a:endParaRPr lang="fr-FR" sz="500" b="1" dirty="0">
               <a:solidFill>
@@ -5020,7 +5424,7 @@
                   <a:schemeClr val="tx1"/>
                 </a:solidFill>
               </a:rPr>
-              <a:t>STEER CMD DESTINATION</a:t>
+              <a:t>--</a:t>
             </a:r>
           </a:p>
           <a:p>
@@ -5031,7 +5435,15 @@
                   <a:srgbClr val="FF0000"/>
                 </a:solidFill>
               </a:rPr>
-              <a:t>WEAPON SELECTOR OFF</a:t>
+              <a:t>WEAPON </a:t>
+            </a:r>
+            <a:r>
+              <a:rPr lang="fr-FR" sz="500" b="1" dirty="0" smtClean="0">
+                <a:solidFill>
+                  <a:srgbClr val="FF0000"/>
+                </a:solidFill>
+              </a:rPr>
+              <a:t>SELECTOR OFF</a:t>
             </a:r>
             <a:endParaRPr lang="fr-FR" sz="500" b="1" dirty="0">
               <a:solidFill>
@@ -5091,8 +5503,13 @@
                   <a:schemeClr val="tx1"/>
                 </a:solidFill>
               </a:rPr>
-              <a:t>STEER CMD VEC</a:t>
-            </a:r>
+              <a:t>--</a:t>
+            </a:r>
+            <a:endParaRPr lang="fr-FR" sz="500" b="1" dirty="0" smtClean="0">
+              <a:solidFill>
+                <a:schemeClr val="tx1"/>
+              </a:solidFill>
+            </a:endParaRPr>
           </a:p>
           <a:p>
             <a:pPr algn="ctr"/>
@@ -5162,8 +5579,13 @@
                   <a:schemeClr val="tx1"/>
                 </a:solidFill>
               </a:rPr>
-              <a:t>STEER CMD AWL/PCD</a:t>
-            </a:r>
+              <a:t>--</a:t>
+            </a:r>
+            <a:endParaRPr lang="fr-FR" sz="500" b="1" dirty="0" smtClean="0">
+              <a:solidFill>
+                <a:schemeClr val="tx1"/>
+              </a:solidFill>
+            </a:endParaRPr>
           </a:p>
           <a:p>
             <a:pPr algn="ctr"/>
@@ -5233,8 +5655,13 @@
                   <a:schemeClr val="tx1"/>
                 </a:solidFill>
               </a:rPr>
-              <a:t>STEER CMD TACAN</a:t>
-            </a:r>
+              <a:t>--</a:t>
+            </a:r>
+            <a:endParaRPr lang="fr-FR" sz="500" b="1" dirty="0" smtClean="0">
+              <a:solidFill>
+                <a:schemeClr val="tx1"/>
+              </a:solidFill>
+            </a:endParaRPr>
           </a:p>
           <a:p>
             <a:pPr algn="ctr"/>
@@ -6177,10 +6604,29 @@
             <a:r>
               <a:rPr lang="fr-FR" sz="400" b="1" dirty="0" smtClean="0">
                 <a:solidFill>
+                  <a:schemeClr val="tx1"/>
+                </a:solidFill>
+              </a:rPr>
+              <a:t>SPOILER BOTH</a:t>
+            </a:r>
+          </a:p>
+          <a:p>
+            <a:pPr algn="ctr"/>
+            <a:r>
+              <a:rPr lang="fr-FR" sz="400" b="1" dirty="0" smtClean="0">
+                <a:solidFill>
                   <a:srgbClr val="FF0000"/>
                 </a:solidFill>
               </a:rPr>
-              <a:t>HEADING HOLD ON</a:t>
+              <a:t>HEADING </a:t>
+            </a:r>
+            <a:r>
+              <a:rPr lang="fr-FR" sz="400" b="1" dirty="0" smtClean="0">
+                <a:solidFill>
+                  <a:srgbClr val="FF0000"/>
+                </a:solidFill>
+              </a:rPr>
+              <a:t>HOLD ON</a:t>
             </a:r>
             <a:endParaRPr lang="fr-FR" sz="400" b="1" dirty="0">
               <a:solidFill>
@@ -7322,12 +7768,44 @@
           <a:p>
             <a:pPr algn="ctr"/>
             <a:r>
+              <a:rPr lang="fr-FR" sz="400" b="1" dirty="0">
+                <a:solidFill>
+                  <a:schemeClr val="tx1"/>
+                </a:solidFill>
+              </a:rPr>
+              <a:t>SPOILER </a:t>
+            </a:r>
+            <a:r>
               <a:rPr lang="fr-FR" sz="400" b="1" dirty="0" smtClean="0">
                 <a:solidFill>
+                  <a:schemeClr val="tx1"/>
+                </a:solidFill>
+              </a:rPr>
+              <a:t>OFF</a:t>
+            </a:r>
+            <a:endParaRPr lang="fr-FR" sz="400" b="1" dirty="0">
+              <a:solidFill>
+                <a:schemeClr val="tx1"/>
+              </a:solidFill>
+            </a:endParaRPr>
+          </a:p>
+          <a:p>
+            <a:pPr algn="ctr"/>
+            <a:r>
+              <a:rPr lang="fr-FR" sz="400" b="1" dirty="0" smtClean="0">
+                <a:solidFill>
                   <a:srgbClr val="FF0000"/>
                 </a:solidFill>
               </a:rPr>
-              <a:t>HEADING HOLD OFF</a:t>
+              <a:t>HEADING </a:t>
+            </a:r>
+            <a:r>
+              <a:rPr lang="fr-FR" sz="400" b="1" dirty="0" smtClean="0">
+                <a:solidFill>
+                  <a:srgbClr val="FF0000"/>
+                </a:solidFill>
+              </a:rPr>
+              <a:t>HOLD OFF</a:t>
             </a:r>
             <a:endParaRPr lang="fr-FR" sz="400" b="1" dirty="0">
               <a:solidFill>
@@ -7373,12 +7851,44 @@
           <a:p>
             <a:pPr algn="ctr"/>
             <a:r>
+              <a:rPr lang="fr-FR" sz="400" b="1" dirty="0">
+                <a:solidFill>
+                  <a:schemeClr val="tx1"/>
+                </a:solidFill>
+              </a:rPr>
+              <a:t>SPOILER </a:t>
+            </a:r>
+            <a:r>
               <a:rPr lang="fr-FR" sz="400" b="1" dirty="0" smtClean="0">
                 <a:solidFill>
+                  <a:schemeClr val="tx1"/>
+                </a:solidFill>
+              </a:rPr>
+              <a:t>BK</a:t>
+            </a:r>
+            <a:endParaRPr lang="fr-FR" sz="400" b="1" dirty="0">
+              <a:solidFill>
+                <a:schemeClr val="tx1"/>
+              </a:solidFill>
+            </a:endParaRPr>
+          </a:p>
+          <a:p>
+            <a:pPr algn="ctr"/>
+            <a:r>
+              <a:rPr lang="fr-FR" sz="400" b="1" dirty="0" smtClean="0">
+                <a:solidFill>
                   <a:srgbClr val="FF0000"/>
                 </a:solidFill>
               </a:rPr>
-              <a:t>TERRAIN HOLD</a:t>
+              <a:t>TERRAIN </a:t>
+            </a:r>
+            <a:r>
+              <a:rPr lang="fr-FR" sz="400" b="1" dirty="0" smtClean="0">
+                <a:solidFill>
+                  <a:srgbClr val="FF0000"/>
+                </a:solidFill>
+              </a:rPr>
+              <a:t>HOLD</a:t>
             </a:r>
             <a:endParaRPr lang="fr-FR" sz="400" b="1" dirty="0">
               <a:solidFill>
@@ -7610,8 +8120,48 @@
                   <a:schemeClr val="tx1"/>
                 </a:solidFill>
               </a:rPr>
-              <a:t>AUTO THROTTLE</a:t>
-            </a:r>
+              <a:t>VDI mode </a:t>
+            </a:r>
+            <a:r>
+              <a:rPr lang="fr-FR" sz="500" b="1" dirty="0" err="1" smtClean="0">
+                <a:solidFill>
+                  <a:schemeClr val="tx1"/>
+                </a:solidFill>
+              </a:rPr>
+              <a:t>Norm</a:t>
+            </a:r>
+            <a:r>
+              <a:rPr lang="fr-FR" sz="500" b="1" dirty="0" smtClean="0">
+                <a:solidFill>
+                  <a:schemeClr val="tx1"/>
+                </a:solidFill>
+              </a:rPr>
+              <a:t>/TV</a:t>
+            </a:r>
+          </a:p>
+          <a:p>
+            <a:pPr algn="ctr"/>
+            <a:r>
+              <a:rPr lang="fr-FR" sz="500" b="1" dirty="0">
+                <a:solidFill>
+                  <a:srgbClr val="FF0000"/>
+                </a:solidFill>
+              </a:rPr>
+              <a:t>AUTO </a:t>
+            </a:r>
+            <a:r>
+              <a:rPr lang="fr-FR" sz="500" b="1" dirty="0" smtClean="0">
+                <a:solidFill>
+                  <a:srgbClr val="FF0000"/>
+                </a:solidFill>
+              </a:rPr>
+              <a:t>THROTTLE</a:t>
+            </a:r>
+            <a:endParaRPr lang="fr-FR" sz="500" b="1" dirty="0">
+              <a:solidFill>
+                <a:srgbClr val="FF0000"/>
+              </a:solidFill>
+            </a:endParaRPr>
           </a:p>
         </p:txBody>
       </p:sp>
@@ -7889,11 +8439,6 @@
               </a:rPr>
               <a:t>MASTER ARM ON</a:t>
             </a:r>
-            <a:endParaRPr lang="fr-FR" sz="500" b="1" dirty="0" smtClean="0">
-              <a:solidFill>
-                <a:schemeClr val="tx1"/>
-              </a:solidFill>
-            </a:endParaRPr>
           </a:p>
         </p:txBody>
       </p:sp>
@@ -8051,11 +8596,6 @@
               </a:rPr>
               <a:t>MASTER ARM OFF</a:t>
             </a:r>
-            <a:endParaRPr lang="fr-FR" sz="500" b="1" dirty="0" smtClean="0">
-              <a:solidFill>
-                <a:schemeClr val="tx1"/>
-              </a:solidFill>
-            </a:endParaRPr>
           </a:p>
         </p:txBody>
       </p:sp>
@@ -8067,8 +8607,8 @@
         </p:nvSpPr>
         <p:spPr>
           <a:xfrm>
-            <a:off x="2398725" y="713047"/>
-            <a:ext cx="561168" cy="152400"/>
+            <a:off x="2290763" y="713047"/>
+            <a:ext cx="669130" cy="152400"/>
           </a:xfrm>
           <a:prstGeom prst="roundRect">
             <a:avLst/>
@@ -8109,7 +8649,7 @@
                   <a:schemeClr val="tx1"/>
                 </a:solidFill>
               </a:rPr>
-              <a:t>ACM ON</a:t>
+              <a:t>HOOK BYPASS FIELD</a:t>
             </a:r>
             <a:endParaRPr lang="fr-FR" sz="500" b="1" dirty="0" smtClean="0">
               <a:solidFill>
@@ -8127,8 +8667,8 @@
         </p:nvSpPr>
         <p:spPr>
           <a:xfrm>
-            <a:off x="2398725" y="915258"/>
-            <a:ext cx="561168" cy="152400"/>
+            <a:off x="2290763" y="915258"/>
+            <a:ext cx="669130" cy="152400"/>
           </a:xfrm>
           <a:prstGeom prst="roundRect">
             <a:avLst/>
@@ -8164,16 +8704,228 @@
           <a:p>
             <a:pPr algn="ctr"/>
             <a:r>
-              <a:rPr lang="fr-FR" sz="500" b="1" dirty="0" smtClean="0">
+              <a:rPr lang="fr-FR" sz="500" b="1" dirty="0">
                 <a:solidFill>
                   <a:schemeClr val="tx1"/>
                 </a:solidFill>
               </a:rPr>
-              <a:t>ACM OFF</a:t>
-            </a:r>
-            <a:endParaRPr lang="fr-FR" sz="500" b="1" dirty="0" smtClean="0">
+              <a:t>HOOK BYPASS </a:t>
+            </a:r>
+            <a:r>
+              <a:rPr lang="fr-FR" sz="500" b="1" dirty="0" smtClean="0">
+                <a:solidFill>
+                  <a:schemeClr val="tx1"/>
+                </a:solidFill>
+              </a:rPr>
+              <a:t>CARRIER</a:t>
+            </a:r>
+            <a:endParaRPr lang="fr-FR" sz="500" b="1" dirty="0">
               <a:solidFill>
                 <a:schemeClr val="tx1"/>
+              </a:solidFill>
+            </a:endParaRPr>
+          </a:p>
+        </p:txBody>
+      </p:sp>
+      <p:sp>
+        <p:nvSpPr>
+          <p:cNvPr id="121" name="Rectangle à coins arrondis 111"/>
+          <p:cNvSpPr/>
+          <p:nvPr/>
+        </p:nvSpPr>
+        <p:spPr>
+          <a:xfrm>
+            <a:off x="4603350" y="2126690"/>
+            <a:ext cx="416122" cy="106480"/>
+          </a:xfrm>
+          <a:prstGeom prst="roundRect">
+            <a:avLst/>
+          </a:prstGeom>
+          <a:ln/>
+        </p:spPr>
+        <p:style>
+          <a:lnRef idx="2">
+            <a:schemeClr val="accent1"/>
+          </a:lnRef>
+          <a:fillRef idx="1">
+            <a:schemeClr val="lt1"/>
+          </a:fillRef>
+          <a:effectRef idx="0">
+            <a:schemeClr val="accent1"/>
+          </a:effectRef>
+          <a:fontRef idx="minor">
+            <a:schemeClr val="dk1"/>
+          </a:fontRef>
+        </p:style>
+        <p:txBody>
+          <a:bodyPr lIns="0" tIns="0" rIns="0" bIns="0" rtlCol="0" anchor="ctr"/>
+          <a:lstStyle/>
+          <a:p>
+            <a:pPr algn="ctr"/>
+            <a:r>
+              <a:rPr lang="fr-FR" sz="500" b="1" dirty="0" smtClean="0">
+                <a:solidFill>
+                  <a:schemeClr val="tx1"/>
+                </a:solidFill>
+              </a:rPr>
+              <a:t>ACM ON</a:t>
+            </a:r>
+            <a:endParaRPr lang="fr-FR" sz="500" b="1" dirty="0">
+              <a:solidFill>
+                <a:srgbClr val="FF0000"/>
+              </a:solidFill>
+            </a:endParaRPr>
+          </a:p>
+        </p:txBody>
+      </p:sp>
+      <p:sp>
+        <p:nvSpPr>
+          <p:cNvPr id="122" name="Rectangle à coins arrondis 111"/>
+          <p:cNvSpPr/>
+          <p:nvPr/>
+        </p:nvSpPr>
+        <p:spPr>
+          <a:xfrm>
+            <a:off x="4603350" y="2272800"/>
+            <a:ext cx="416122" cy="106480"/>
+          </a:xfrm>
+          <a:prstGeom prst="roundRect">
+            <a:avLst/>
+          </a:prstGeom>
+          <a:ln/>
+        </p:spPr>
+        <p:style>
+          <a:lnRef idx="2">
+            <a:schemeClr val="accent1"/>
+          </a:lnRef>
+          <a:fillRef idx="1">
+            <a:schemeClr val="lt1"/>
+          </a:fillRef>
+          <a:effectRef idx="0">
+            <a:schemeClr val="accent1"/>
+          </a:effectRef>
+          <a:fontRef idx="minor">
+            <a:schemeClr val="dk1"/>
+          </a:fontRef>
+        </p:style>
+        <p:txBody>
+          <a:bodyPr lIns="0" tIns="0" rIns="0" bIns="0" rtlCol="0" anchor="ctr"/>
+          <a:lstStyle/>
+          <a:p>
+            <a:pPr algn="ctr"/>
+            <a:r>
+              <a:rPr lang="fr-FR" sz="500" b="1" dirty="0" smtClean="0">
+                <a:solidFill>
+                  <a:schemeClr val="tx1"/>
+                </a:solidFill>
+              </a:rPr>
+              <a:t>ACM OFF</a:t>
+            </a:r>
+            <a:endParaRPr lang="fr-FR" sz="500" b="1" dirty="0">
+              <a:solidFill>
+                <a:srgbClr val="FF0000"/>
+              </a:solidFill>
+            </a:endParaRPr>
+          </a:p>
+        </p:txBody>
+      </p:sp>
+      <p:sp>
+        <p:nvSpPr>
+          <p:cNvPr id="123" name="Rectangle à coins arrondis 111"/>
+          <p:cNvSpPr/>
+          <p:nvPr/>
+        </p:nvSpPr>
+        <p:spPr>
+          <a:xfrm>
+            <a:off x="4601775" y="1626602"/>
+            <a:ext cx="416122" cy="106480"/>
+          </a:xfrm>
+          <a:prstGeom prst="roundRect">
+            <a:avLst/>
+          </a:prstGeom>
+          <a:ln/>
+        </p:spPr>
+        <p:style>
+          <a:lnRef idx="2">
+            <a:schemeClr val="accent1"/>
+          </a:lnRef>
+          <a:fillRef idx="1">
+            <a:schemeClr val="lt1"/>
+          </a:fillRef>
+          <a:effectRef idx="0">
+            <a:schemeClr val="accent1"/>
+          </a:effectRef>
+          <a:fontRef idx="minor">
+            <a:schemeClr val="dk1"/>
+          </a:fontRef>
+        </p:style>
+        <p:txBody>
+          <a:bodyPr lIns="0" tIns="0" rIns="0" bIns="0" rtlCol="0" anchor="ctr"/>
+          <a:lstStyle/>
+          <a:p>
+            <a:pPr algn="ctr"/>
+            <a:r>
+              <a:rPr lang="fr-FR" sz="500" b="1" dirty="0" smtClean="0">
+                <a:solidFill>
+                  <a:schemeClr val="tx1"/>
+                </a:solidFill>
+              </a:rPr>
+              <a:t>AN/ARA ON</a:t>
+            </a:r>
+            <a:endParaRPr lang="fr-FR" sz="500" b="1" dirty="0">
+              <a:solidFill>
+                <a:srgbClr val="FF0000"/>
+              </a:solidFill>
+            </a:endParaRPr>
+          </a:p>
+        </p:txBody>
+      </p:sp>
+      <p:sp>
+        <p:nvSpPr>
+          <p:cNvPr id="124" name="Rectangle à coins arrondis 111"/>
+          <p:cNvSpPr/>
+          <p:nvPr/>
+        </p:nvSpPr>
+        <p:spPr>
+          <a:xfrm>
+            <a:off x="4601775" y="1772712"/>
+            <a:ext cx="416122" cy="106480"/>
+          </a:xfrm>
+          <a:prstGeom prst="roundRect">
+            <a:avLst/>
+          </a:prstGeom>
+          <a:ln/>
+        </p:spPr>
+        <p:style>
+          <a:lnRef idx="2">
+            <a:schemeClr val="accent1"/>
+          </a:lnRef>
+          <a:fillRef idx="1">
+            <a:schemeClr val="lt1"/>
+          </a:fillRef>
+          <a:effectRef idx="0">
+            <a:schemeClr val="accent1"/>
+          </a:effectRef>
+          <a:fontRef idx="minor">
+            <a:schemeClr val="dk1"/>
+          </a:fontRef>
+        </p:style>
+        <p:txBody>
+          <a:bodyPr lIns="0" tIns="0" rIns="0" bIns="0" rtlCol="0" anchor="ctr"/>
+          <a:lstStyle/>
+          <a:p>
+            <a:pPr algn="ctr"/>
+            <a:r>
+              <a:rPr lang="fr-FR" sz="500" b="1" dirty="0" smtClean="0">
+                <a:solidFill>
+                  <a:schemeClr val="tx1"/>
+                </a:solidFill>
+              </a:rPr>
+              <a:t>AN/ARA OFF</a:t>
+            </a:r>
+            <a:endParaRPr lang="fr-FR" sz="500" b="1" dirty="0">
+              <a:solidFill>
+                <a:srgbClr val="FF0000"/>
               </a:solidFill>
             </a:endParaRPr>
           </a:p>
@@ -8458,4 +9210,265 @@
     </a:ext>
   </a:extLst>
 </a:theme>
+</file>
+
+<file path=ppt/theme/theme2.xml><?xml version="1.0" encoding="utf-8"?>
+<a:theme xmlns:a="http://schemas.openxmlformats.org/drawingml/2006/main" name="Thème Office">
+  <a:themeElements>
+    <a:clrScheme name="Office">
+      <a:dk1>
+        <a:sysClr val="windowText" lastClr="000000"/>
+      </a:dk1>
+      <a:lt1>
+        <a:sysClr val="window" lastClr="FFFFFF"/>
+      </a:lt1>
+      <a:dk2>
+        <a:srgbClr val="44546A"/>
+      </a:dk2>
+      <a:lt2>
+        <a:srgbClr val="E7E6E6"/>
+      </a:lt2>
+      <a:accent1>
+        <a:srgbClr val="5B9BD5"/>
+      </a:accent1>
+      <a:accent2>
+        <a:srgbClr val="ED7D31"/>
+      </a:accent2>
+      <a:accent3>
+        <a:srgbClr val="A5A5A5"/>
+      </a:accent3>
+      <a:accent4>
+        <a:srgbClr val="FFC000"/>
+      </a:accent4>
+      <a:accent5>
+        <a:srgbClr val="4472C4"/>
+      </a:accent5>
+      <a:accent6>
+        <a:srgbClr val="70AD47"/>
+      </a:accent6>
+      <a:hlink>
+        <a:srgbClr val="0563C1"/>
+      </a:hlink>
+      <a:folHlink>
+        <a:srgbClr val="954F72"/>
+      </a:folHlink>
+    </a:clrScheme>
+    <a:fontScheme name="Office">
+      <a:majorFont>
+        <a:latin typeface="Calibri Light" panose="020F0302020204030204"/>
+        <a:ea typeface=""/>
+        <a:cs typeface=""/>
+        <a:font script="Jpan" typeface="游ゴシック Light"/>
+        <a:font script="Hang" typeface="맑은 고딕"/>
+        <a:font script="Hans" typeface="等线 Light"/>
+        <a:font script="Hant" typeface="新細明體"/>
+        <a:font script="Arab" typeface="Times New Roman"/>
+        <a:font script="Hebr" typeface="Times New Roman"/>
+        <a:font script="Thai" typeface="Angsana New"/>
+        <a:font script="Ethi" typeface="Nyala"/>
+        <a:font script="Beng" typeface="Vrinda"/>
+        <a:font script="Gujr" typeface="Shruti"/>
+        <a:font script="Khmr" typeface="MoolBoran"/>
+        <a:font script="Knda" typeface="Tunga"/>
+        <a:font script="Guru" typeface="Raavi"/>
+        <a:font script="Cans" typeface="Euphemia"/>
+        <a:font script="Cher" typeface="Plantagenet Cherokee"/>
+        <a:font script="Yiii" typeface="Microsoft Yi Baiti"/>
+        <a:font script="Tibt" typeface="Microsoft Himalaya"/>
+        <a:font script="Thaa" typeface="MV Boli"/>
+        <a:font script="Deva" typeface="Mangal"/>
+        <a:font script="Telu" typeface="Gautami"/>
+        <a:font script="Taml" typeface="Latha"/>
+        <a:font script="Syrc" typeface="Estrangelo Edessa"/>
+        <a:font script="Orya" typeface="Kalinga"/>
+        <a:font script="Mlym" typeface="Kartika"/>
+        <a:font script="Laoo" typeface="DokChampa"/>
+        <a:font script="Sinh" typeface="Iskoola Pota"/>
+        <a:font script="Mong" typeface="Mongolian Baiti"/>
+        <a:font script="Viet" typeface="Times New Roman"/>
+        <a:font script="Uigh" typeface="Microsoft Uighur"/>
+        <a:font script="Geor" typeface="Sylfaen"/>
+      </a:majorFont>
+      <a:minorFont>
+        <a:latin typeface="Calibri" panose="020F0502020204030204"/>
+        <a:ea typeface=""/>
+        <a:cs typeface=""/>
+        <a:font script="Jpan" typeface="游ゴシック"/>
+        <a:font script="Hang" typeface="맑은 고딕"/>
+        <a:font script="Hans" typeface="等线"/>
+        <a:font script="Hant" typeface="新細明體"/>
+        <a:font script="Arab" typeface="Arial"/>
+        <a:font script="Hebr" typeface="Arial"/>
+        <a:font script="Thai" typeface="Cordia New"/>
+        <a:font script="Ethi" typeface="Nyala"/>
+        <a:font script="Beng" typeface="Vrinda"/>
+        <a:font script="Gujr" typeface="Shruti"/>
+        <a:font script="Khmr" typeface="DaunPenh"/>
+        <a:font script="Knda" typeface="Tunga"/>
+        <a:font script="Guru" typeface="Raavi"/>
+        <a:font script="Cans" typeface="Euphemia"/>
+        <a:font script="Cher" typeface="Plantagenet Cherokee"/>
+        <a:font script="Yiii" typeface="Microsoft Yi Baiti"/>
+        <a:font script="Tibt" typeface="Microsoft Himalaya"/>
+        <a:font script="Thaa" typeface="MV Boli"/>
+        <a:font script="Deva" typeface="Mangal"/>
+        <a:font script="Telu" typeface="Gautami"/>
+        <a:font script="Taml" typeface="Latha"/>
+        <a:font script="Syrc" typeface="Estrangelo Edessa"/>
+        <a:font script="Orya" typeface="Kalinga"/>
+        <a:font script="Mlym" typeface="Kartika"/>
+        <a:font script="Laoo" typeface="DokChampa"/>
+        <a:font script="Sinh" typeface="Iskoola Pota"/>
+        <a:font script="Mong" typeface="Mongolian Baiti"/>
+        <a:font script="Viet" typeface="Arial"/>
+        <a:font script="Uigh" typeface="Microsoft Uighur"/>
+        <a:font script="Geor" typeface="Sylfaen"/>
+      </a:minorFont>
+    </a:fontScheme>
+    <a:fmtScheme name="Office">
+      <a:fillStyleLst>
+        <a:solidFill>
+          <a:schemeClr val="phClr"/>
+        </a:solidFill>
+        <a:gradFill rotWithShape="1">
+          <a:gsLst>
+            <a:gs pos="0">
+              <a:schemeClr val="phClr">
+                <a:lumMod val="110000"/>
+                <a:satMod val="105000"/>
+                <a:tint val="67000"/>
+              </a:schemeClr>
+            </a:gs>
+            <a:gs pos="50000">
+              <a:schemeClr val="phClr">
+                <a:lumMod val="105000"/>
+                <a:satMod val="103000"/>
+                <a:tint val="73000"/>
+              </a:schemeClr>
+            </a:gs>
+            <a:gs pos="100000">
+              <a:schemeClr val="phClr">
+                <a:lumMod val="105000"/>
+                <a:satMod val="109000"/>
+                <a:tint val="81000"/>
+              </a:schemeClr>
+            </a:gs>
+          </a:gsLst>
+          <a:lin ang="5400000" scaled="0"/>
+        </a:gradFill>
+        <a:gradFill rotWithShape="1">
+          <a:gsLst>
+            <a:gs pos="0">
+              <a:schemeClr val="phClr">
+                <a:satMod val="103000"/>
+                <a:lumMod val="102000"/>
+                <a:tint val="94000"/>
+              </a:schemeClr>
+            </a:gs>
+            <a:gs pos="50000">
+              <a:schemeClr val="phClr">
+                <a:satMod val="110000"/>
+                <a:lumMod val="100000"/>
+                <a:shade val="100000"/>
+              </a:schemeClr>
+            </a:gs>
+            <a:gs pos="100000">
+              <a:schemeClr val="phClr">
+                <a:lumMod val="99000"/>
+                <a:satMod val="120000"/>
+                <a:shade val="78000"/>
+              </a:schemeClr>
+            </a:gs>
+          </a:gsLst>
+          <a:lin ang="5400000" scaled="0"/>
+        </a:gradFill>
+      </a:fillStyleLst>
+      <a:lnStyleLst>
+        <a:ln w="6350" cap="flat" cmpd="sng" algn="ctr">
+          <a:solidFill>
+            <a:schemeClr val="phClr"/>
+          </a:solidFill>
+          <a:prstDash val="solid"/>
+          <a:miter lim="800000"/>
+        </a:ln>
+        <a:ln w="12700" cap="flat" cmpd="sng" algn="ctr">
+          <a:solidFill>
+            <a:schemeClr val="phClr"/>
+          </a:solidFill>
+          <a:prstDash val="solid"/>
+          <a:miter lim="800000"/>
+        </a:ln>
+        <a:ln w="19050" cap="flat" cmpd="sng" algn="ctr">
+          <a:solidFill>
+            <a:schemeClr val="phClr"/>
+          </a:solidFill>
+          <a:prstDash val="solid"/>
+          <a:miter lim="800000"/>
+        </a:ln>
+      </a:lnStyleLst>
+      <a:effectStyleLst>
+        <a:effectStyle>
+          <a:effectLst/>
+        </a:effectStyle>
+        <a:effectStyle>
+          <a:effectLst/>
+        </a:effectStyle>
+        <a:effectStyle>
+          <a:effectLst>
+            <a:outerShdw blurRad="57150" dist="19050" dir="5400000" algn="ctr" rotWithShape="0">
+              <a:srgbClr val="000000">
+                <a:alpha val="63000"/>
+              </a:srgbClr>
+            </a:outerShdw>
+          </a:effectLst>
+        </a:effectStyle>
+      </a:effectStyleLst>
+      <a:bgFillStyleLst>
+        <a:solidFill>
+          <a:schemeClr val="phClr"/>
+        </a:solidFill>
+        <a:solidFill>
+          <a:schemeClr val="phClr">
+            <a:tint val="95000"/>
+            <a:satMod val="170000"/>
+          </a:schemeClr>
+        </a:solidFill>
+        <a:gradFill rotWithShape="1">
+          <a:gsLst>
+            <a:gs pos="0">
+              <a:schemeClr val="phClr">
+                <a:tint val="93000"/>
+                <a:satMod val="150000"/>
+                <a:shade val="98000"/>
+                <a:lumMod val="102000"/>
+              </a:schemeClr>
+            </a:gs>
+            <a:gs pos="50000">
+              <a:schemeClr val="phClr">
+                <a:tint val="98000"/>
+                <a:satMod val="130000"/>
+                <a:shade val="90000"/>
+                <a:lumMod val="103000"/>
+              </a:schemeClr>
+            </a:gs>
+            <a:gs pos="100000">
+              <a:schemeClr val="phClr">
+                <a:shade val="63000"/>
+                <a:satMod val="120000"/>
+              </a:schemeClr>
+            </a:gs>
+          </a:gsLst>
+          <a:lin ang="5400000" scaled="0"/>
+        </a:gradFill>
+      </a:bgFillStyleLst>
+    </a:fmtScheme>
+  </a:themeElements>
+  <a:objectDefaults/>
+  <a:extraClrSchemeLst/>
+  <a:extLst>
+    <a:ext uri="{05A4C25C-085E-4340-85A3-A5531E510DB2}">
+      <thm15:themeFamily xmlns:thm15="http://schemas.microsoft.com/office/thememl/2012/main" name="Office Theme" id="{62F939B6-93AF-4DB8-9C6B-D6C7DFDC589F}" vid="{4A3C46E8-61CC-4603-A589-7422A47A8E4A}"/>
+    </a:ext>
+  </a:extLst>
+</a:theme>
 </file>
</xml_diff>